<commit_message>
Adding Week4 and Week5 Slides
</commit_message>
<xml_diff>
--- a/doc/java/slides/week4.pptx
+++ b/doc/java/slides/week4.pptx
@@ -5,10 +5,10 @@
     <p:sldMasterId id="2147483648" r:id="rId4"/>
   </p:sldMasterIdLst>
   <p:notesMasterIdLst>
-    <p:notesMasterId r:id="rId21"/>
+    <p:notesMasterId r:id="rId15"/>
   </p:notesMasterIdLst>
   <p:handoutMasterIdLst>
-    <p:handoutMasterId r:id="rId22"/>
+    <p:handoutMasterId r:id="rId16"/>
   </p:handoutMasterIdLst>
   <p:sldIdLst>
     <p:sldId id="259" r:id="rId5"/>
@@ -21,12 +21,6 @@
     <p:sldId id="264" r:id="rId12"/>
     <p:sldId id="265" r:id="rId13"/>
     <p:sldId id="266" r:id="rId14"/>
-    <p:sldId id="267" r:id="rId15"/>
-    <p:sldId id="268" r:id="rId16"/>
-    <p:sldId id="269" r:id="rId17"/>
-    <p:sldId id="270" r:id="rId18"/>
-    <p:sldId id="271" r:id="rId19"/>
-    <p:sldId id="272" r:id="rId20"/>
   </p:sldIdLst>
   <p:sldSz cx="12188825" cy="6858000"/>
   <p:notesSz cx="6858000" cy="9144000"/>
@@ -240,7 +234,7 @@
           <a:p>
             <a:fld id="{1C482589-CB2F-4003-801D-095B67490E73}" type="datetimeFigureOut">
               <a:rPr lang="en-US"/>
-              <a:t>10/25/2018</a:t>
+              <a:t>11/8/2018</a:t>
             </a:fld>
             <a:endParaRPr/>
           </a:p>
@@ -405,7 +399,7 @@
           <a:p>
             <a:fld id="{2A7D4DBF-746C-4C25-853D-8A1CBE8404F4}" type="datetimeFigureOut">
               <a:rPr lang="en-US"/>
-              <a:t>10/25/2018</a:t>
+              <a:t>11/8/2018</a:t>
             </a:fld>
             <a:endParaRPr/>
           </a:p>
@@ -1220,7 +1214,7 @@
             <a:fld id="{881DC1F7-A9E9-4D8B-8C97-C74523B2CF2A}" type="datetimeFigureOut">
               <a:rPr lang="en-US" smtClean="0"/>
               <a:pPr/>
-              <a:t>10/25/2018</a:t>
+              <a:t>11/8/2018</a:t>
             </a:fld>
             <a:endParaRPr lang="en-US"/>
           </a:p>
@@ -1432,7 +1426,7 @@
             <a:fld id="{881DC1F7-A9E9-4D8B-8C97-C74523B2CF2A}" type="datetimeFigureOut">
               <a:rPr lang="en-US" smtClean="0"/>
               <a:pPr/>
-              <a:t>10/25/2018</a:t>
+              <a:t>11/8/2018</a:t>
             </a:fld>
             <a:endParaRPr lang="en-US"/>
           </a:p>
@@ -1654,7 +1648,7 @@
             <a:fld id="{881DC1F7-A9E9-4D8B-8C97-C74523B2CF2A}" type="datetimeFigureOut">
               <a:rPr lang="en-US" smtClean="0"/>
               <a:pPr/>
-              <a:t>10/25/2018</a:t>
+              <a:t>11/8/2018</a:t>
             </a:fld>
             <a:endParaRPr lang="en-US"/>
           </a:p>
@@ -1866,7 +1860,7 @@
             <a:fld id="{881DC1F7-A9E9-4D8B-8C97-C74523B2CF2A}" type="datetimeFigureOut">
               <a:rPr lang="en-US" smtClean="0"/>
               <a:pPr/>
-              <a:t>10/25/2018</a:t>
+              <a:t>11/8/2018</a:t>
             </a:fld>
             <a:endParaRPr lang="en-US"/>
           </a:p>
@@ -2141,7 +2135,7 @@
             <a:fld id="{881DC1F7-A9E9-4D8B-8C97-C74523B2CF2A}" type="datetimeFigureOut">
               <a:rPr lang="en-US" smtClean="0"/>
               <a:pPr/>
-              <a:t>10/25/2018</a:t>
+              <a:t>11/8/2018</a:t>
             </a:fld>
             <a:endParaRPr lang="en-US"/>
           </a:p>
@@ -2459,7 +2453,7 @@
             <a:fld id="{881DC1F7-A9E9-4D8B-8C97-C74523B2CF2A}" type="datetimeFigureOut">
               <a:rPr lang="en-US" smtClean="0"/>
               <a:pPr/>
-              <a:t>10/25/2018</a:t>
+              <a:t>11/8/2018</a:t>
             </a:fld>
             <a:endParaRPr lang="en-US"/>
           </a:p>
@@ -2917,7 +2911,7 @@
             <a:fld id="{881DC1F7-A9E9-4D8B-8C97-C74523B2CF2A}" type="datetimeFigureOut">
               <a:rPr lang="en-US" smtClean="0"/>
               <a:pPr/>
-              <a:t>10/25/2018</a:t>
+              <a:t>11/8/2018</a:t>
             </a:fld>
             <a:endParaRPr lang="en-US"/>
           </a:p>
@@ -3061,7 +3055,7 @@
             <a:fld id="{881DC1F7-A9E9-4D8B-8C97-C74523B2CF2A}" type="datetimeFigureOut">
               <a:rPr lang="en-US" smtClean="0"/>
               <a:pPr/>
-              <a:t>10/25/2018</a:t>
+              <a:t>11/8/2018</a:t>
             </a:fld>
             <a:endParaRPr lang="en-US"/>
           </a:p>
@@ -3182,7 +3176,7 @@
             <a:fld id="{881DC1F7-A9E9-4D8B-8C97-C74523B2CF2A}" type="datetimeFigureOut">
               <a:rPr lang="en-US" smtClean="0"/>
               <a:pPr/>
-              <a:t>10/25/2018</a:t>
+              <a:t>11/8/2018</a:t>
             </a:fld>
             <a:endParaRPr lang="en-US"/>
           </a:p>
@@ -3591,7 +3585,7 @@
             <a:fld id="{881DC1F7-A9E9-4D8B-8C97-C74523B2CF2A}" type="datetimeFigureOut">
               <a:rPr lang="en-US" smtClean="0"/>
               <a:pPr/>
-              <a:t>10/25/2018</a:t>
+              <a:t>11/8/2018</a:t>
             </a:fld>
             <a:endParaRPr lang="en-US"/>
           </a:p>
@@ -3998,7 +3992,7 @@
             <a:fld id="{881DC1F7-A9E9-4D8B-8C97-C74523B2CF2A}" type="datetimeFigureOut">
               <a:rPr lang="en-US" smtClean="0"/>
               <a:pPr/>
-              <a:t>10/25/2018</a:t>
+              <a:t>11/8/2018</a:t>
             </a:fld>
             <a:endParaRPr lang="en-US"/>
           </a:p>
@@ -4256,7 +4250,7 @@
             <a:fld id="{881DC1F7-A9E9-4D8B-8C97-C74523B2CF2A}" type="datetimeFigureOut">
               <a:rPr lang="en-US"/>
               <a:pPr/>
-              <a:t>10/25/2018</a:t>
+              <a:t>11/8/2018</a:t>
             </a:fld>
             <a:endParaRPr/>
           </a:p>
@@ -4821,15 +4815,15 @@
             <a:pPr lvl="1"/>
             <a:r>
               <a:rPr lang="en-US" dirty="0" smtClean="0"/>
-              <a:t>Challenge: How w </a:t>
-            </a:r>
-            <a:r>
-              <a:rPr lang="en-US" dirty="0" err="1" smtClean="0"/>
-              <a:t>ould</a:t>
+              <a:t>Challenge: </a:t>
+            </a:r>
+            <a:r>
+              <a:rPr lang="en-US" smtClean="0"/>
+              <a:t>How would </a:t>
             </a:r>
             <a:r>
               <a:rPr lang="en-US" dirty="0" smtClean="0"/>
-              <a:t> you print all values in the </a:t>
+              <a:t>you print all values in the </a:t>
             </a:r>
             <a:r>
               <a:rPr lang="en-US" dirty="0" err="1" smtClean="0"/>
@@ -4847,724 +4841,6 @@
     <p:extLst>
       <p:ext uri="{BB962C8B-B14F-4D97-AF65-F5344CB8AC3E}">
         <p14:creationId xmlns:p14="http://schemas.microsoft.com/office/powerpoint/2010/main" val="555188812"/>
-      </p:ext>
-    </p:extLst>
-  </p:cSld>
-  <p:clrMapOvr>
-    <a:masterClrMapping/>
-  </p:clrMapOvr>
-  <mc:AlternateContent xmlns:mc="http://schemas.openxmlformats.org/markup-compatibility/2006" xmlns:p14="http://schemas.microsoft.com/office/powerpoint/2010/main">
-    <mc:Choice Requires="p14">
-      <p:transition spd="med" p14:dur="700">
-        <p:fade/>
-      </p:transition>
-    </mc:Choice>
-    <mc:Fallback xmlns="">
-      <p:transition spd="med">
-        <p:fade/>
-      </p:transition>
-    </mc:Fallback>
-  </mc:AlternateContent>
-</p:sld>
-</file>
-
-<file path=ppt/slides/slide11.xml><?xml version="1.0" encoding="utf-8"?>
-<p:sld xmlns:a="http://schemas.openxmlformats.org/drawingml/2006/main" xmlns:r="http://schemas.openxmlformats.org/officeDocument/2006/relationships" xmlns:p="http://schemas.openxmlformats.org/presentationml/2006/main">
-  <p:cSld>
-    <p:spTree>
-      <p:nvGrpSpPr>
-        <p:cNvPr id="1" name=""/>
-        <p:cNvGrpSpPr/>
-        <p:nvPr/>
-      </p:nvGrpSpPr>
-      <p:grpSpPr>
-        <a:xfrm>
-          <a:off x="0" y="0"/>
-          <a:ext cx="0" cy="0"/>
-          <a:chOff x="0" y="0"/>
-          <a:chExt cx="0" cy="0"/>
-        </a:xfrm>
-      </p:grpSpPr>
-      <p:sp>
-        <p:nvSpPr>
-          <p:cNvPr id="2" name="Title 1"/>
-          <p:cNvSpPr>
-            <a:spLocks noGrp="1"/>
-          </p:cNvSpPr>
-          <p:nvPr>
-            <p:ph type="title"/>
-          </p:nvPr>
-        </p:nvSpPr>
-        <p:spPr/>
-        <p:txBody>
-          <a:bodyPr/>
-          <a:lstStyle/>
-          <a:p>
-            <a:r>
-              <a:rPr lang="en-US" dirty="0" smtClean="0"/>
-              <a:t>Java Methods</a:t>
-            </a:r>
-            <a:endParaRPr lang="en-US" dirty="0"/>
-          </a:p>
-        </p:txBody>
-      </p:sp>
-      <p:sp>
-        <p:nvSpPr>
-          <p:cNvPr id="3" name="Content Placeholder 2"/>
-          <p:cNvSpPr>
-            <a:spLocks noGrp="1"/>
-          </p:cNvSpPr>
-          <p:nvPr>
-            <p:ph idx="1"/>
-          </p:nvPr>
-        </p:nvSpPr>
-        <p:spPr/>
-        <p:txBody>
-          <a:bodyPr/>
-          <a:lstStyle/>
-          <a:p>
-            <a:r>
-              <a:rPr lang="en-US" dirty="0"/>
-              <a:t>A Java method is a collection of statements that are grouped together to perform an operation</a:t>
-            </a:r>
-            <a:r>
-              <a:rPr lang="en-US" dirty="0" smtClean="0"/>
-              <a:t>.</a:t>
-            </a:r>
-          </a:p>
-          <a:p>
-            <a:r>
-              <a:rPr lang="en-US" dirty="0" smtClean="0"/>
-              <a:t>Many of the methods we have been using: </a:t>
-            </a:r>
-            <a:r>
-              <a:rPr lang="en-US" dirty="0" err="1" smtClean="0"/>
-              <a:t>println</a:t>
-            </a:r>
-            <a:r>
-              <a:rPr lang="en-US" dirty="0" smtClean="0"/>
-              <a:t>(), main() … are all methods that the JDK provides us</a:t>
-            </a:r>
-          </a:p>
-          <a:p>
-            <a:endParaRPr lang="en-US" dirty="0"/>
-          </a:p>
-        </p:txBody>
-      </p:sp>
-    </p:spTree>
-    <p:extLst>
-      <p:ext uri="{BB962C8B-B14F-4D97-AF65-F5344CB8AC3E}">
-        <p14:creationId xmlns:p14="http://schemas.microsoft.com/office/powerpoint/2010/main" val="1720851370"/>
-      </p:ext>
-    </p:extLst>
-  </p:cSld>
-  <p:clrMapOvr>
-    <a:masterClrMapping/>
-  </p:clrMapOvr>
-  <mc:AlternateContent xmlns:mc="http://schemas.openxmlformats.org/markup-compatibility/2006" xmlns:p14="http://schemas.microsoft.com/office/powerpoint/2010/main">
-    <mc:Choice Requires="p14">
-      <p:transition spd="med" p14:dur="700">
-        <p:fade/>
-      </p:transition>
-    </mc:Choice>
-    <mc:Fallback xmlns="">
-      <p:transition spd="med">
-        <p:fade/>
-      </p:transition>
-    </mc:Fallback>
-  </mc:AlternateContent>
-</p:sld>
-</file>
-
-<file path=ppt/slides/slide12.xml><?xml version="1.0" encoding="utf-8"?>
-<p:sld xmlns:a="http://schemas.openxmlformats.org/drawingml/2006/main" xmlns:r="http://schemas.openxmlformats.org/officeDocument/2006/relationships" xmlns:p="http://schemas.openxmlformats.org/presentationml/2006/main">
-  <p:cSld>
-    <p:spTree>
-      <p:nvGrpSpPr>
-        <p:cNvPr id="1" name=""/>
-        <p:cNvGrpSpPr/>
-        <p:nvPr/>
-      </p:nvGrpSpPr>
-      <p:grpSpPr>
-        <a:xfrm>
-          <a:off x="0" y="0"/>
-          <a:ext cx="0" cy="0"/>
-          <a:chOff x="0" y="0"/>
-          <a:chExt cx="0" cy="0"/>
-        </a:xfrm>
-      </p:grpSpPr>
-      <p:sp>
-        <p:nvSpPr>
-          <p:cNvPr id="2" name="Title 1"/>
-          <p:cNvSpPr>
-            <a:spLocks noGrp="1"/>
-          </p:cNvSpPr>
-          <p:nvPr>
-            <p:ph type="title"/>
-          </p:nvPr>
-        </p:nvSpPr>
-        <p:spPr/>
-        <p:txBody>
-          <a:bodyPr/>
-          <a:lstStyle/>
-          <a:p>
-            <a:r>
-              <a:rPr lang="en-US" dirty="0" smtClean="0"/>
-              <a:t>Methods… in general</a:t>
-            </a:r>
-            <a:endParaRPr lang="en-US" dirty="0"/>
-          </a:p>
-        </p:txBody>
-      </p:sp>
-      <p:pic>
-        <p:nvPicPr>
-          <p:cNvPr id="4" name="Content Placeholder 3"/>
-          <p:cNvPicPr>
-            <a:picLocks noGrp="1" noChangeAspect="1"/>
-          </p:cNvPicPr>
-          <p:nvPr>
-            <p:ph idx="1"/>
-          </p:nvPr>
-        </p:nvPicPr>
-        <p:blipFill>
-          <a:blip r:embed="rId2"/>
-          <a:stretch>
-            <a:fillRect/>
-          </a:stretch>
-        </p:blipFill>
-        <p:spPr>
-          <a:xfrm>
-            <a:off x="1293812" y="2133600"/>
-            <a:ext cx="4696480" cy="714475"/>
-          </a:xfrm>
-          <a:prstGeom prst="rect">
-            <a:avLst/>
-          </a:prstGeom>
-        </p:spPr>
-      </p:pic>
-      <p:pic>
-        <p:nvPicPr>
-          <p:cNvPr id="6" name="Picture 5"/>
-          <p:cNvPicPr>
-            <a:picLocks noChangeAspect="1"/>
-          </p:cNvPicPr>
-          <p:nvPr/>
-        </p:nvPicPr>
-        <p:blipFill>
-          <a:blip r:embed="rId3"/>
-          <a:stretch>
-            <a:fillRect/>
-          </a:stretch>
-        </p:blipFill>
-        <p:spPr>
-          <a:xfrm>
-            <a:off x="7237412" y="1828800"/>
-            <a:ext cx="4113886" cy="2160705"/>
-          </a:xfrm>
-          <a:prstGeom prst="rect">
-            <a:avLst/>
-          </a:prstGeom>
-        </p:spPr>
-      </p:pic>
-      <p:pic>
-        <p:nvPicPr>
-          <p:cNvPr id="7" name="Picture 6"/>
-          <p:cNvPicPr>
-            <a:picLocks noChangeAspect="1"/>
-          </p:cNvPicPr>
-          <p:nvPr/>
-        </p:nvPicPr>
-        <p:blipFill>
-          <a:blip r:embed="rId4"/>
-          <a:stretch>
-            <a:fillRect/>
-          </a:stretch>
-        </p:blipFill>
-        <p:spPr>
-          <a:xfrm>
-            <a:off x="1293813" y="3109964"/>
-            <a:ext cx="4696480" cy="596249"/>
-          </a:xfrm>
-          <a:prstGeom prst="rect">
-            <a:avLst/>
-          </a:prstGeom>
-        </p:spPr>
-      </p:pic>
-      <p:pic>
-        <p:nvPicPr>
-          <p:cNvPr id="8" name="Picture 7"/>
-          <p:cNvPicPr>
-            <a:picLocks noChangeAspect="1"/>
-          </p:cNvPicPr>
-          <p:nvPr/>
-        </p:nvPicPr>
-        <p:blipFill>
-          <a:blip r:embed="rId5"/>
-          <a:stretch>
-            <a:fillRect/>
-          </a:stretch>
-        </p:blipFill>
-        <p:spPr>
-          <a:xfrm>
-            <a:off x="1293812" y="4101386"/>
-            <a:ext cx="6496957" cy="2381582"/>
-          </a:xfrm>
-          <a:prstGeom prst="rect">
-            <a:avLst/>
-          </a:prstGeom>
-        </p:spPr>
-      </p:pic>
-    </p:spTree>
-    <p:extLst>
-      <p:ext uri="{BB962C8B-B14F-4D97-AF65-F5344CB8AC3E}">
-        <p14:creationId xmlns:p14="http://schemas.microsoft.com/office/powerpoint/2010/main" val="511979438"/>
-      </p:ext>
-    </p:extLst>
-  </p:cSld>
-  <p:clrMapOvr>
-    <a:masterClrMapping/>
-  </p:clrMapOvr>
-  <mc:AlternateContent xmlns:mc="http://schemas.openxmlformats.org/markup-compatibility/2006" xmlns:p14="http://schemas.microsoft.com/office/powerpoint/2010/main">
-    <mc:Choice Requires="p14">
-      <p:transition spd="med" p14:dur="700">
-        <p:fade/>
-      </p:transition>
-    </mc:Choice>
-    <mc:Fallback xmlns="">
-      <p:transition spd="med">
-        <p:fade/>
-      </p:transition>
-    </mc:Fallback>
-  </mc:AlternateContent>
-</p:sld>
-</file>
-
-<file path=ppt/slides/slide13.xml><?xml version="1.0" encoding="utf-8"?>
-<p:sld xmlns:a="http://schemas.openxmlformats.org/drawingml/2006/main" xmlns:r="http://schemas.openxmlformats.org/officeDocument/2006/relationships" xmlns:p="http://schemas.openxmlformats.org/presentationml/2006/main">
-  <p:cSld>
-    <p:spTree>
-      <p:nvGrpSpPr>
-        <p:cNvPr id="1" name=""/>
-        <p:cNvGrpSpPr/>
-        <p:nvPr/>
-      </p:nvGrpSpPr>
-      <p:grpSpPr>
-        <a:xfrm>
-          <a:off x="0" y="0"/>
-          <a:ext cx="0" cy="0"/>
-          <a:chOff x="0" y="0"/>
-          <a:chExt cx="0" cy="0"/>
-        </a:xfrm>
-      </p:grpSpPr>
-      <p:sp>
-        <p:nvSpPr>
-          <p:cNvPr id="2" name="Title 1"/>
-          <p:cNvSpPr>
-            <a:spLocks noGrp="1"/>
-          </p:cNvSpPr>
-          <p:nvPr>
-            <p:ph type="title"/>
-          </p:nvPr>
-        </p:nvSpPr>
-        <p:spPr/>
-        <p:txBody>
-          <a:bodyPr/>
-          <a:lstStyle/>
-          <a:p>
-            <a:r>
-              <a:rPr lang="en-US" dirty="0" smtClean="0"/>
-              <a:t>Let’s try it</a:t>
-            </a:r>
-            <a:endParaRPr lang="en-US" dirty="0"/>
-          </a:p>
-        </p:txBody>
-      </p:sp>
-      <p:sp>
-        <p:nvSpPr>
-          <p:cNvPr id="3" name="Content Placeholder 2"/>
-          <p:cNvSpPr>
-            <a:spLocks noGrp="1"/>
-          </p:cNvSpPr>
-          <p:nvPr>
-            <p:ph idx="1"/>
-          </p:nvPr>
-        </p:nvSpPr>
-        <p:spPr/>
-        <p:txBody>
-          <a:bodyPr/>
-          <a:lstStyle/>
-          <a:p>
-            <a:r>
-              <a:rPr lang="en-US" dirty="0" smtClean="0"/>
-              <a:t>Write a method that calculated the minimum of two values</a:t>
-            </a:r>
-          </a:p>
-          <a:p>
-            <a:pPr lvl="1"/>
-            <a:r>
-              <a:rPr lang="en-US" dirty="0" smtClean="0"/>
-              <a:t>Method should take in two parameters’</a:t>
-            </a:r>
-          </a:p>
-          <a:p>
-            <a:pPr lvl="1"/>
-            <a:r>
-              <a:rPr lang="en-US" dirty="0" smtClean="0"/>
-              <a:t>Call the method inside the main method</a:t>
-            </a:r>
-          </a:p>
-          <a:p>
-            <a:pPr marL="365760" lvl="1" indent="0">
-              <a:buNone/>
-            </a:pPr>
-            <a:endParaRPr lang="en-US" dirty="0"/>
-          </a:p>
-        </p:txBody>
-      </p:sp>
-    </p:spTree>
-    <p:extLst>
-      <p:ext uri="{BB962C8B-B14F-4D97-AF65-F5344CB8AC3E}">
-        <p14:creationId xmlns:p14="http://schemas.microsoft.com/office/powerpoint/2010/main" val="2947765514"/>
-      </p:ext>
-    </p:extLst>
-  </p:cSld>
-  <p:clrMapOvr>
-    <a:masterClrMapping/>
-  </p:clrMapOvr>
-  <mc:AlternateContent xmlns:mc="http://schemas.openxmlformats.org/markup-compatibility/2006" xmlns:p14="http://schemas.microsoft.com/office/powerpoint/2010/main">
-    <mc:Choice Requires="p14">
-      <p:transition spd="med" p14:dur="700">
-        <p:fade/>
-      </p:transition>
-    </mc:Choice>
-    <mc:Fallback xmlns="">
-      <p:transition spd="med">
-        <p:fade/>
-      </p:transition>
-    </mc:Fallback>
-  </mc:AlternateContent>
-</p:sld>
-</file>
-
-<file path=ppt/slides/slide14.xml><?xml version="1.0" encoding="utf-8"?>
-<p:sld xmlns:a="http://schemas.openxmlformats.org/drawingml/2006/main" xmlns:r="http://schemas.openxmlformats.org/officeDocument/2006/relationships" xmlns:p="http://schemas.openxmlformats.org/presentationml/2006/main">
-  <p:cSld>
-    <p:spTree>
-      <p:nvGrpSpPr>
-        <p:cNvPr id="1" name=""/>
-        <p:cNvGrpSpPr/>
-        <p:nvPr/>
-      </p:nvGrpSpPr>
-      <p:grpSpPr>
-        <a:xfrm>
-          <a:off x="0" y="0"/>
-          <a:ext cx="0" cy="0"/>
-          <a:chOff x="0" y="0"/>
-          <a:chExt cx="0" cy="0"/>
-        </a:xfrm>
-      </p:grpSpPr>
-      <p:sp>
-        <p:nvSpPr>
-          <p:cNvPr id="2" name="Title 1"/>
-          <p:cNvSpPr>
-            <a:spLocks noGrp="1"/>
-          </p:cNvSpPr>
-          <p:nvPr>
-            <p:ph type="title"/>
-          </p:nvPr>
-        </p:nvSpPr>
-        <p:spPr/>
-        <p:txBody>
-          <a:bodyPr/>
-          <a:lstStyle/>
-          <a:p>
-            <a:r>
-              <a:rPr lang="en-US" dirty="0" smtClean="0"/>
-              <a:t>Methods</a:t>
-            </a:r>
-            <a:endParaRPr lang="en-US" dirty="0"/>
-          </a:p>
-        </p:txBody>
-      </p:sp>
-      <p:sp>
-        <p:nvSpPr>
-          <p:cNvPr id="3" name="Content Placeholder 2"/>
-          <p:cNvSpPr>
-            <a:spLocks noGrp="1"/>
-          </p:cNvSpPr>
-          <p:nvPr>
-            <p:ph idx="1"/>
-          </p:nvPr>
-        </p:nvSpPr>
-        <p:spPr/>
-        <p:txBody>
-          <a:bodyPr/>
-          <a:lstStyle/>
-          <a:p>
-            <a:r>
-              <a:rPr lang="en-US" dirty="0"/>
-              <a:t>The void keyword allows us to create methods which do not return a </a:t>
-            </a:r>
-            <a:r>
-              <a:rPr lang="en-US" dirty="0" smtClean="0"/>
-              <a:t>value.</a:t>
-            </a:r>
-          </a:p>
-          <a:p>
-            <a:r>
-              <a:rPr lang="en-US" dirty="0" smtClean="0"/>
-              <a:t>The datatype that defines the method should be the same datatype return by the method</a:t>
-            </a:r>
-          </a:p>
-          <a:p>
-            <a:pPr lvl="1"/>
-            <a:r>
-              <a:rPr lang="en-US" dirty="0" smtClean="0"/>
-              <a:t>Else you have datatype mismatches</a:t>
-            </a:r>
-          </a:p>
-          <a:p>
-            <a:pPr lvl="1"/>
-            <a:endParaRPr lang="en-US" dirty="0"/>
-          </a:p>
-        </p:txBody>
-      </p:sp>
-    </p:spTree>
-    <p:extLst>
-      <p:ext uri="{BB962C8B-B14F-4D97-AF65-F5344CB8AC3E}">
-        <p14:creationId xmlns:p14="http://schemas.microsoft.com/office/powerpoint/2010/main" val="2726688330"/>
-      </p:ext>
-    </p:extLst>
-  </p:cSld>
-  <p:clrMapOvr>
-    <a:masterClrMapping/>
-  </p:clrMapOvr>
-  <mc:AlternateContent xmlns:mc="http://schemas.openxmlformats.org/markup-compatibility/2006" xmlns:p14="http://schemas.microsoft.com/office/powerpoint/2010/main">
-    <mc:Choice Requires="p14">
-      <p:transition spd="med" p14:dur="700">
-        <p:fade/>
-      </p:transition>
-    </mc:Choice>
-    <mc:Fallback xmlns="">
-      <p:transition spd="med">
-        <p:fade/>
-      </p:transition>
-    </mc:Fallback>
-  </mc:AlternateContent>
-</p:sld>
-</file>
-
-<file path=ppt/slides/slide15.xml><?xml version="1.0" encoding="utf-8"?>
-<p:sld xmlns:a="http://schemas.openxmlformats.org/drawingml/2006/main" xmlns:r="http://schemas.openxmlformats.org/officeDocument/2006/relationships" xmlns:p="http://schemas.openxmlformats.org/presentationml/2006/main">
-  <p:cSld>
-    <p:spTree>
-      <p:nvGrpSpPr>
-        <p:cNvPr id="1" name=""/>
-        <p:cNvGrpSpPr/>
-        <p:nvPr/>
-      </p:nvGrpSpPr>
-      <p:grpSpPr>
-        <a:xfrm>
-          <a:off x="0" y="0"/>
-          <a:ext cx="0" cy="0"/>
-          <a:chOff x="0" y="0"/>
-          <a:chExt cx="0" cy="0"/>
-        </a:xfrm>
-      </p:grpSpPr>
-      <p:sp>
-        <p:nvSpPr>
-          <p:cNvPr id="2" name="Title 1"/>
-          <p:cNvSpPr>
-            <a:spLocks noGrp="1"/>
-          </p:cNvSpPr>
-          <p:nvPr>
-            <p:ph type="title"/>
-          </p:nvPr>
-        </p:nvSpPr>
-        <p:spPr/>
-        <p:txBody>
-          <a:bodyPr/>
-          <a:lstStyle/>
-          <a:p>
-            <a:r>
-              <a:rPr lang="en-US" dirty="0" smtClean="0"/>
-              <a:t>Method Overloading</a:t>
-            </a:r>
-            <a:endParaRPr lang="en-US" dirty="0"/>
-          </a:p>
-        </p:txBody>
-      </p:sp>
-      <p:sp>
-        <p:nvSpPr>
-          <p:cNvPr id="3" name="Content Placeholder 2"/>
-          <p:cNvSpPr>
-            <a:spLocks noGrp="1"/>
-          </p:cNvSpPr>
-          <p:nvPr>
-            <p:ph idx="1"/>
-          </p:nvPr>
-        </p:nvSpPr>
-        <p:spPr/>
-        <p:txBody>
-          <a:bodyPr/>
-          <a:lstStyle/>
-          <a:p>
-            <a:r>
-              <a:rPr lang="en-US" dirty="0"/>
-              <a:t>When a class has two or more methods by the same name but different parameters, it is known as method overloading. </a:t>
-            </a:r>
-            <a:endParaRPr lang="en-US" dirty="0" smtClean="0"/>
-          </a:p>
-          <a:p>
-            <a:r>
-              <a:rPr lang="en-US" dirty="0" smtClean="0"/>
-              <a:t>Be careful in the concept, as this is not the same thing as Overriding</a:t>
-            </a:r>
-          </a:p>
-          <a:p>
-            <a:endParaRPr lang="en-US" dirty="0"/>
-          </a:p>
-        </p:txBody>
-      </p:sp>
-      <p:pic>
-        <p:nvPicPr>
-          <p:cNvPr id="4" name="Picture 3"/>
-          <p:cNvPicPr>
-            <a:picLocks noChangeAspect="1"/>
-          </p:cNvPicPr>
-          <p:nvPr/>
-        </p:nvPicPr>
-        <p:blipFill>
-          <a:blip r:embed="rId2"/>
-          <a:stretch>
-            <a:fillRect/>
-          </a:stretch>
-        </p:blipFill>
-        <p:spPr>
-          <a:xfrm>
-            <a:off x="1674812" y="3495259"/>
-            <a:ext cx="7068536" cy="2981741"/>
-          </a:xfrm>
-          <a:prstGeom prst="rect">
-            <a:avLst/>
-          </a:prstGeom>
-        </p:spPr>
-      </p:pic>
-    </p:spTree>
-    <p:extLst>
-      <p:ext uri="{BB962C8B-B14F-4D97-AF65-F5344CB8AC3E}">
-        <p14:creationId xmlns:p14="http://schemas.microsoft.com/office/powerpoint/2010/main" val="23646291"/>
-      </p:ext>
-    </p:extLst>
-  </p:cSld>
-  <p:clrMapOvr>
-    <a:masterClrMapping/>
-  </p:clrMapOvr>
-  <mc:AlternateContent xmlns:mc="http://schemas.openxmlformats.org/markup-compatibility/2006" xmlns:p14="http://schemas.microsoft.com/office/powerpoint/2010/main">
-    <mc:Choice Requires="p14">
-      <p:transition spd="med" p14:dur="700">
-        <p:fade/>
-      </p:transition>
-    </mc:Choice>
-    <mc:Fallback xmlns="">
-      <p:transition spd="med">
-        <p:fade/>
-      </p:transition>
-    </mc:Fallback>
-  </mc:AlternateContent>
-</p:sld>
-</file>
-
-<file path=ppt/slides/slide16.xml><?xml version="1.0" encoding="utf-8"?>
-<p:sld xmlns:a="http://schemas.openxmlformats.org/drawingml/2006/main" xmlns:r="http://schemas.openxmlformats.org/officeDocument/2006/relationships" xmlns:p="http://schemas.openxmlformats.org/presentationml/2006/main">
-  <p:cSld>
-    <p:spTree>
-      <p:nvGrpSpPr>
-        <p:cNvPr id="1" name=""/>
-        <p:cNvGrpSpPr/>
-        <p:nvPr/>
-      </p:nvGrpSpPr>
-      <p:grpSpPr>
-        <a:xfrm>
-          <a:off x="0" y="0"/>
-          <a:ext cx="0" cy="0"/>
-          <a:chOff x="0" y="0"/>
-          <a:chExt cx="0" cy="0"/>
-        </a:xfrm>
-      </p:grpSpPr>
-      <p:sp>
-        <p:nvSpPr>
-          <p:cNvPr id="2" name="Title 1"/>
-          <p:cNvSpPr>
-            <a:spLocks noGrp="1"/>
-          </p:cNvSpPr>
-          <p:nvPr>
-            <p:ph type="title"/>
-          </p:nvPr>
-        </p:nvSpPr>
-        <p:spPr/>
-        <p:txBody>
-          <a:bodyPr/>
-          <a:lstStyle/>
-          <a:p>
-            <a:r>
-              <a:rPr lang="en-US" dirty="0" smtClean="0"/>
-              <a:t>Method </a:t>
-            </a:r>
-            <a:r>
-              <a:rPr lang="en-US" dirty="0" smtClean="0"/>
-              <a:t>Overloading</a:t>
-            </a:r>
-            <a:endParaRPr lang="en-US" dirty="0"/>
-          </a:p>
-        </p:txBody>
-      </p:sp>
-      <p:sp>
-        <p:nvSpPr>
-          <p:cNvPr id="3" name="Content Placeholder 2"/>
-          <p:cNvSpPr>
-            <a:spLocks noGrp="1"/>
-          </p:cNvSpPr>
-          <p:nvPr>
-            <p:ph idx="1"/>
-          </p:nvPr>
-        </p:nvSpPr>
-        <p:spPr/>
-        <p:txBody>
-          <a:bodyPr/>
-          <a:lstStyle/>
-          <a:p>
-            <a:r>
-              <a:rPr lang="en-US" dirty="0" smtClean="0"/>
-              <a:t>From our previous example of finding the minimum of two numbers… </a:t>
-            </a:r>
-          </a:p>
-          <a:p>
-            <a:pPr lvl="1"/>
-            <a:r>
-              <a:rPr lang="en-US" dirty="0" smtClean="0"/>
-              <a:t>What happens when the parameters are a double rather than </a:t>
-            </a:r>
-            <a:r>
-              <a:rPr lang="en-US" dirty="0" err="1" smtClean="0"/>
-              <a:t>int</a:t>
-            </a:r>
-            <a:endParaRPr lang="en-US" dirty="0" smtClean="0"/>
-          </a:p>
-          <a:p>
-            <a:pPr lvl="1"/>
-            <a:r>
-              <a:rPr lang="en-US" dirty="0" smtClean="0"/>
-              <a:t>Let’s try it…</a:t>
-            </a:r>
-            <a:endParaRPr lang="en-US" dirty="0"/>
-          </a:p>
-        </p:txBody>
-      </p:sp>
-    </p:spTree>
-    <p:extLst>
-      <p:ext uri="{BB962C8B-B14F-4D97-AF65-F5344CB8AC3E}">
-        <p14:creationId xmlns:p14="http://schemas.microsoft.com/office/powerpoint/2010/main" val="1392175288"/>
       </p:ext>
     </p:extLst>
   </p:cSld>
@@ -5654,26 +4930,22 @@
           </a:p>
           <a:p>
             <a:r>
+              <a:rPr lang="en-US" dirty="0"/>
+              <a:t>Write a program to calculate the sum of first </a:t>
+            </a:r>
+            <a:r>
               <a:rPr lang="en-US" dirty="0" smtClean="0"/>
-              <a:t>Create a do while loop that starts at value 10 and increments to 16</a:t>
+              <a:t>100 </a:t>
+            </a:r>
+            <a:r>
+              <a:rPr lang="en-US" dirty="0"/>
+              <a:t>natural number.</a:t>
             </a:r>
           </a:p>
           <a:p>
             <a:r>
               <a:rPr lang="en-US" dirty="0" smtClean="0"/>
-              <a:t>Create </a:t>
-            </a:r>
-            <a:r>
-              <a:rPr lang="en-US" smtClean="0"/>
-              <a:t>a while </a:t>
-            </a:r>
-            <a:r>
-              <a:rPr lang="en-US" dirty="0" smtClean="0"/>
-              <a:t>loop that </a:t>
-            </a:r>
-            <a:r>
-              <a:rPr lang="en-US" smtClean="0"/>
-              <a:t>is infinite and never quits (We will do this together!)</a:t>
+              <a:t>Create a while loop that is infinite and never quits (We will do this together!)</a:t>
             </a:r>
             <a:endParaRPr lang="en-US" dirty="0"/>
           </a:p>
@@ -6220,19 +5492,19 @@
             <a:pPr lvl="1"/>
             <a:r>
               <a:rPr lang="en-US" dirty="0" smtClean="0"/>
-              <a:t>Declare a </a:t>
-            </a:r>
-            <a:r>
-              <a:rPr lang="en-US" smtClean="0"/>
-              <a:t>variable l1 with </a:t>
-            </a:r>
-            <a:r>
-              <a:rPr lang="en-US" dirty="0" smtClean="0"/>
-              <a:t>the value of the </a:t>
+              <a:t>Declare a variable level_1 with a value of the </a:t>
             </a:r>
             <a:r>
               <a:rPr lang="en-US" dirty="0" err="1" smtClean="0"/>
               <a:t>Enum</a:t>
+            </a:r>
+            <a:endParaRPr lang="en-US" dirty="0" smtClean="0"/>
+          </a:p>
+          <a:p>
+            <a:pPr lvl="1"/>
+            <a:r>
+              <a:rPr lang="en-US" dirty="0" smtClean="0"/>
+              <a:t>Print level_1</a:t>
             </a:r>
             <a:endParaRPr lang="en-US" dirty="0"/>
           </a:p>
@@ -7628,6 +6900,132 @@
 </file>
 
 <file path=customXml/item1.xml><?xml version="1.0" encoding="utf-8"?>
+<p:properties xmlns:p="http://schemas.microsoft.com/office/2006/metadata/properties" xmlns:xsi="http://www.w3.org/2001/XMLSchema-instance" xmlns:pc="http://schemas.microsoft.com/office/infopath/2007/PartnerControls">
+  <documentManagement>
+    <DirectSourceMarket xmlns="4873beb7-5857-4685-be1f-d57550cc96cc" xsi:nil="true"/>
+    <ApprovalStatus xmlns="4873beb7-5857-4685-be1f-d57550cc96cc">InProgress</ApprovalStatus>
+    <MarketSpecific xmlns="4873beb7-5857-4685-be1f-d57550cc96cc">false</MarketSpecific>
+    <LocComments xmlns="4873beb7-5857-4685-be1f-d57550cc96cc" xsi:nil="true"/>
+    <ThumbnailAssetId xmlns="4873beb7-5857-4685-be1f-d57550cc96cc" xsi:nil="true"/>
+    <PrimaryImageGen xmlns="4873beb7-5857-4685-be1f-d57550cc96cc">false</PrimaryImageGen>
+    <LegacyData xmlns="4873beb7-5857-4685-be1f-d57550cc96cc" xsi:nil="true"/>
+    <LocRecommendedHandoff xmlns="4873beb7-5857-4685-be1f-d57550cc96cc" xsi:nil="true"/>
+    <BusinessGroup xmlns="4873beb7-5857-4685-be1f-d57550cc96cc" xsi:nil="true"/>
+    <BlockPublish xmlns="4873beb7-5857-4685-be1f-d57550cc96cc">false</BlockPublish>
+    <TPFriendlyName xmlns="4873beb7-5857-4685-be1f-d57550cc96cc" xsi:nil="true"/>
+    <NumericId xmlns="4873beb7-5857-4685-be1f-d57550cc96cc" xsi:nil="true"/>
+    <APEditor xmlns="4873beb7-5857-4685-be1f-d57550cc96cc">
+      <UserInfo>
+        <DisplayName/>
+        <AccountId xsi:nil="true"/>
+        <AccountType/>
+      </UserInfo>
+    </APEditor>
+    <SourceTitle xmlns="4873beb7-5857-4685-be1f-d57550cc96cc" xsi:nil="true"/>
+    <OpenTemplate xmlns="4873beb7-5857-4685-be1f-d57550cc96cc">true</OpenTemplate>
+    <UALocComments xmlns="4873beb7-5857-4685-be1f-d57550cc96cc" xsi:nil="true"/>
+    <ParentAssetId xmlns="4873beb7-5857-4685-be1f-d57550cc96cc" xsi:nil="true"/>
+    <IntlLangReviewDate xmlns="4873beb7-5857-4685-be1f-d57550cc96cc" xsi:nil="true"/>
+    <FeatureTagsTaxHTField0 xmlns="4873beb7-5857-4685-be1f-d57550cc96cc">
+      <Terms xmlns="http://schemas.microsoft.com/office/infopath/2007/PartnerControls"/>
+    </FeatureTagsTaxHTField0>
+    <PublishStatusLookup xmlns="4873beb7-5857-4685-be1f-d57550cc96cc">
+      <Value>1360511</Value>
+    </PublishStatusLookup>
+    <Providers xmlns="4873beb7-5857-4685-be1f-d57550cc96cc" xsi:nil="true"/>
+    <MachineTranslated xmlns="4873beb7-5857-4685-be1f-d57550cc96cc">false</MachineTranslated>
+    <OriginalSourceMarket xmlns="4873beb7-5857-4685-be1f-d57550cc96cc" xsi:nil="true"/>
+    <APDescription xmlns="4873beb7-5857-4685-be1f-d57550cc96cc" xsi:nil="true"/>
+    <ClipArtFilename xmlns="4873beb7-5857-4685-be1f-d57550cc96cc" xsi:nil="true"/>
+    <ContentItem xmlns="4873beb7-5857-4685-be1f-d57550cc96cc" xsi:nil="true"/>
+    <TPInstallLocation xmlns="4873beb7-5857-4685-be1f-d57550cc96cc" xsi:nil="true"/>
+    <PublishTargets xmlns="4873beb7-5857-4685-be1f-d57550cc96cc">OfficeOnlineVNext</PublishTargets>
+    <TimesCloned xmlns="4873beb7-5857-4685-be1f-d57550cc96cc" xsi:nil="true"/>
+    <AssetStart xmlns="4873beb7-5857-4685-be1f-d57550cc96cc">2011-12-12T13:37:00+00:00</AssetStart>
+    <Provider xmlns="4873beb7-5857-4685-be1f-d57550cc96cc" xsi:nil="true"/>
+    <AcquiredFrom xmlns="4873beb7-5857-4685-be1f-d57550cc96cc">Internal MS</AcquiredFrom>
+    <FriendlyTitle xmlns="4873beb7-5857-4685-be1f-d57550cc96cc" xsi:nil="true"/>
+    <LastHandOff xmlns="4873beb7-5857-4685-be1f-d57550cc96cc" xsi:nil="true"/>
+    <TPClientViewer xmlns="4873beb7-5857-4685-be1f-d57550cc96cc" xsi:nil="true"/>
+    <UACurrentWords xmlns="4873beb7-5857-4685-be1f-d57550cc96cc" xsi:nil="true"/>
+    <ArtSampleDocs xmlns="4873beb7-5857-4685-be1f-d57550cc96cc" xsi:nil="true"/>
+    <UALocRecommendation xmlns="4873beb7-5857-4685-be1f-d57550cc96cc">Localize</UALocRecommendation>
+    <Manager xmlns="4873beb7-5857-4685-be1f-d57550cc96cc" xsi:nil="true"/>
+    <ShowIn xmlns="4873beb7-5857-4685-be1f-d57550cc96cc">Show everywhere</ShowIn>
+    <UANotes xmlns="4873beb7-5857-4685-be1f-d57550cc96cc" xsi:nil="true"/>
+    <TemplateStatus xmlns="4873beb7-5857-4685-be1f-d57550cc96cc">Complete</TemplateStatus>
+    <InternalTagsTaxHTField0 xmlns="4873beb7-5857-4685-be1f-d57550cc96cc">
+      <Terms xmlns="http://schemas.microsoft.com/office/infopath/2007/PartnerControls"/>
+    </InternalTagsTaxHTField0>
+    <CSXHash xmlns="4873beb7-5857-4685-be1f-d57550cc96cc" xsi:nil="true"/>
+    <Downloads xmlns="4873beb7-5857-4685-be1f-d57550cc96cc">0</Downloads>
+    <VoteCount xmlns="4873beb7-5857-4685-be1f-d57550cc96cc" xsi:nil="true"/>
+    <OOCacheId xmlns="4873beb7-5857-4685-be1f-d57550cc96cc" xsi:nil="true"/>
+    <IsDeleted xmlns="4873beb7-5857-4685-be1f-d57550cc96cc">false</IsDeleted>
+    <AssetExpire xmlns="4873beb7-5857-4685-be1f-d57550cc96cc">2035-01-01T08:00:00+00:00</AssetExpire>
+    <DSATActionTaken xmlns="4873beb7-5857-4685-be1f-d57550cc96cc" xsi:nil="true"/>
+    <CSXSubmissionMarket xmlns="4873beb7-5857-4685-be1f-d57550cc96cc" xsi:nil="true"/>
+    <TPExecutable xmlns="4873beb7-5857-4685-be1f-d57550cc96cc" xsi:nil="true"/>
+    <SubmitterId xmlns="4873beb7-5857-4685-be1f-d57550cc96cc" xsi:nil="true"/>
+    <EditorialTags xmlns="4873beb7-5857-4685-be1f-d57550cc96cc" xsi:nil="true"/>
+    <ApprovalLog xmlns="4873beb7-5857-4685-be1f-d57550cc96cc" xsi:nil="true"/>
+    <AssetType xmlns="4873beb7-5857-4685-be1f-d57550cc96cc">TP</AssetType>
+    <BugNumber xmlns="4873beb7-5857-4685-be1f-d57550cc96cc" xsi:nil="true"/>
+    <CSXSubmissionDate xmlns="4873beb7-5857-4685-be1f-d57550cc96cc" xsi:nil="true"/>
+    <CSXUpdate xmlns="4873beb7-5857-4685-be1f-d57550cc96cc">false</CSXUpdate>
+    <Milestone xmlns="4873beb7-5857-4685-be1f-d57550cc96cc" xsi:nil="true"/>
+    <RecommendationsModifier xmlns="4873beb7-5857-4685-be1f-d57550cc96cc" xsi:nil="true"/>
+    <OriginAsset xmlns="4873beb7-5857-4685-be1f-d57550cc96cc" xsi:nil="true"/>
+    <TPComponent xmlns="4873beb7-5857-4685-be1f-d57550cc96cc" xsi:nil="true"/>
+    <AssetId xmlns="4873beb7-5857-4685-be1f-d57550cc96cc">TP102801114</AssetId>
+    <IntlLocPriority xmlns="4873beb7-5857-4685-be1f-d57550cc96cc" xsi:nil="true"/>
+    <PolicheckWords xmlns="4873beb7-5857-4685-be1f-d57550cc96cc" xsi:nil="true"/>
+    <TPLaunchHelpLink xmlns="4873beb7-5857-4685-be1f-d57550cc96cc" xsi:nil="true"/>
+    <TPApplication xmlns="4873beb7-5857-4685-be1f-d57550cc96cc" xsi:nil="true"/>
+    <CrawlForDependencies xmlns="4873beb7-5857-4685-be1f-d57550cc96cc">false</CrawlForDependencies>
+    <HandoffToMSDN xmlns="4873beb7-5857-4685-be1f-d57550cc96cc" xsi:nil="true"/>
+    <PlannedPubDate xmlns="4873beb7-5857-4685-be1f-d57550cc96cc" xsi:nil="true"/>
+    <IntlLangReviewer xmlns="4873beb7-5857-4685-be1f-d57550cc96cc" xsi:nil="true"/>
+    <TrustLevel xmlns="4873beb7-5857-4685-be1f-d57550cc96cc">1 Microsoft Managed Content</TrustLevel>
+    <LocLastLocAttemptVersionLookup xmlns="4873beb7-5857-4685-be1f-d57550cc96cc">706531</LocLastLocAttemptVersionLookup>
+    <IsSearchable xmlns="4873beb7-5857-4685-be1f-d57550cc96cc">true</IsSearchable>
+    <TemplateTemplateType xmlns="4873beb7-5857-4685-be1f-d57550cc96cc">PowerPoint Presentation Template</TemplateTemplateType>
+    <CampaignTagsTaxHTField0 xmlns="4873beb7-5857-4685-be1f-d57550cc96cc">
+      <Terms xmlns="http://schemas.microsoft.com/office/infopath/2007/PartnerControls"/>
+    </CampaignTagsTaxHTField0>
+    <TPNamespace xmlns="4873beb7-5857-4685-be1f-d57550cc96cc" xsi:nil="true"/>
+    <TaxCatchAll xmlns="4873beb7-5857-4685-be1f-d57550cc96cc"/>
+    <Markets xmlns="4873beb7-5857-4685-be1f-d57550cc96cc"/>
+    <UAProjectedTotalWords xmlns="4873beb7-5857-4685-be1f-d57550cc96cc" xsi:nil="true"/>
+    <IntlLangReview xmlns="4873beb7-5857-4685-be1f-d57550cc96cc">false</IntlLangReview>
+    <OutputCachingOn xmlns="4873beb7-5857-4685-be1f-d57550cc96cc">false</OutputCachingOn>
+    <AverageRating xmlns="4873beb7-5857-4685-be1f-d57550cc96cc" xsi:nil="true"/>
+    <APAuthor xmlns="4873beb7-5857-4685-be1f-d57550cc96cc">
+      <UserInfo>
+        <DisplayName>REDMOND\v-soujap</DisplayName>
+        <AccountId>1954</AccountId>
+        <AccountType/>
+      </UserInfo>
+    </APAuthor>
+    <LocManualTestRequired xmlns="4873beb7-5857-4685-be1f-d57550cc96cc">false</LocManualTestRequired>
+    <TPCommandLine xmlns="4873beb7-5857-4685-be1f-d57550cc96cc" xsi:nil="true"/>
+    <TPAppVersion xmlns="4873beb7-5857-4685-be1f-d57550cc96cc" xsi:nil="true"/>
+    <EditorialStatus xmlns="4873beb7-5857-4685-be1f-d57550cc96cc">Complete</EditorialStatus>
+    <LastModifiedDateTime xmlns="4873beb7-5857-4685-be1f-d57550cc96cc" xsi:nil="true"/>
+    <ScenarioTagsTaxHTField0 xmlns="4873beb7-5857-4685-be1f-d57550cc96cc">
+      <Terms xmlns="http://schemas.microsoft.com/office/infopath/2007/PartnerControls"/>
+    </ScenarioTagsTaxHTField0>
+    <OriginalRelease xmlns="4873beb7-5857-4685-be1f-d57550cc96cc">14</OriginalRelease>
+    <TPLaunchHelpLinkType xmlns="4873beb7-5857-4685-be1f-d57550cc96cc">Template</TPLaunchHelpLinkType>
+    <LocalizationTagsTaxHTField0 xmlns="4873beb7-5857-4685-be1f-d57550cc96cc">
+      <Terms xmlns="http://schemas.microsoft.com/office/infopath/2007/PartnerControls"/>
+    </LocalizationTagsTaxHTField0>
+    <LocMarketGroupTiers2 xmlns="4873beb7-5857-4685-be1f-d57550cc96cc" xsi:nil="true"/>
+  </documentManagement>
+</p:properties>
+</file>
+
+<file path=customXml/item2.xml><?xml version="1.0" encoding="utf-8"?>
 <?mso-contentType ?>
 <FormTemplates xmlns="http://schemas.microsoft.com/sharepoint/v3/contenttype/forms">
   <Display>DocumentLibraryForm</Display>
@@ -7636,7 +7034,7 @@
 </FormTemplates>
 </file>
 
-<file path=customXml/item2.xml><?xml version="1.0" encoding="utf-8"?>
+<file path=customXml/item3.xml><?xml version="1.0" encoding="utf-8"?>
 <ct:contentTypeSchema xmlns:ct="http://schemas.microsoft.com/office/2006/metadata/contentType" xmlns:ma="http://schemas.microsoft.com/office/2006/metadata/properties/metaAttributes" ct:_="" ma:_="" ma:contentTypeName="TemplateFile" ma:contentTypeID="0x0101006EDDDB5EE6D98C44930B742096920B300400F5B6D36B3EF94B4E9A635CDF2A18F5B8" ma:contentTypeVersion="72" ma:contentTypeDescription="Create a new document." ma:contentTypeScope="" ma:versionID="a23e56308344d904b51738559c3d67c9">
   <xsd:schema xmlns:xsd="http://www.w3.org/2001/XMLSchema" xmlns:xs="http://www.w3.org/2001/XMLSchema" xmlns:p="http://schemas.microsoft.com/office/2006/metadata/properties" xmlns:ns2="4873beb7-5857-4685-be1f-d57550cc96cc" targetNamespace="http://schemas.microsoft.com/office/2006/metadata/properties" ma:root="true" ma:fieldsID="cd0908cc4600e77bf5da051303e00c8d" ns2:_="">
     <xsd:import namespace="4873beb7-5857-4685-be1f-d57550cc96cc"/>
@@ -8676,133 +8074,23 @@
 </ct:contentTypeSchema>
 </file>
 
-<file path=customXml/item3.xml><?xml version="1.0" encoding="utf-8"?>
-<p:properties xmlns:p="http://schemas.microsoft.com/office/2006/metadata/properties" xmlns:xsi="http://www.w3.org/2001/XMLSchema-instance" xmlns:pc="http://schemas.microsoft.com/office/infopath/2007/PartnerControls">
-  <documentManagement>
-    <DirectSourceMarket xmlns="4873beb7-5857-4685-be1f-d57550cc96cc" xsi:nil="true"/>
-    <ApprovalStatus xmlns="4873beb7-5857-4685-be1f-d57550cc96cc">InProgress</ApprovalStatus>
-    <MarketSpecific xmlns="4873beb7-5857-4685-be1f-d57550cc96cc">false</MarketSpecific>
-    <LocComments xmlns="4873beb7-5857-4685-be1f-d57550cc96cc" xsi:nil="true"/>
-    <ThumbnailAssetId xmlns="4873beb7-5857-4685-be1f-d57550cc96cc" xsi:nil="true"/>
-    <PrimaryImageGen xmlns="4873beb7-5857-4685-be1f-d57550cc96cc">false</PrimaryImageGen>
-    <LegacyData xmlns="4873beb7-5857-4685-be1f-d57550cc96cc" xsi:nil="true"/>
-    <LocRecommendedHandoff xmlns="4873beb7-5857-4685-be1f-d57550cc96cc" xsi:nil="true"/>
-    <BusinessGroup xmlns="4873beb7-5857-4685-be1f-d57550cc96cc" xsi:nil="true"/>
-    <BlockPublish xmlns="4873beb7-5857-4685-be1f-d57550cc96cc">false</BlockPublish>
-    <TPFriendlyName xmlns="4873beb7-5857-4685-be1f-d57550cc96cc" xsi:nil="true"/>
-    <NumericId xmlns="4873beb7-5857-4685-be1f-d57550cc96cc" xsi:nil="true"/>
-    <APEditor xmlns="4873beb7-5857-4685-be1f-d57550cc96cc">
-      <UserInfo>
-        <DisplayName/>
-        <AccountId xsi:nil="true"/>
-        <AccountType/>
-      </UserInfo>
-    </APEditor>
-    <SourceTitle xmlns="4873beb7-5857-4685-be1f-d57550cc96cc" xsi:nil="true"/>
-    <OpenTemplate xmlns="4873beb7-5857-4685-be1f-d57550cc96cc">true</OpenTemplate>
-    <UALocComments xmlns="4873beb7-5857-4685-be1f-d57550cc96cc" xsi:nil="true"/>
-    <ParentAssetId xmlns="4873beb7-5857-4685-be1f-d57550cc96cc" xsi:nil="true"/>
-    <IntlLangReviewDate xmlns="4873beb7-5857-4685-be1f-d57550cc96cc" xsi:nil="true"/>
-    <FeatureTagsTaxHTField0 xmlns="4873beb7-5857-4685-be1f-d57550cc96cc">
-      <Terms xmlns="http://schemas.microsoft.com/office/infopath/2007/PartnerControls"/>
-    </FeatureTagsTaxHTField0>
-    <PublishStatusLookup xmlns="4873beb7-5857-4685-be1f-d57550cc96cc">
-      <Value>1360511</Value>
-    </PublishStatusLookup>
-    <Providers xmlns="4873beb7-5857-4685-be1f-d57550cc96cc" xsi:nil="true"/>
-    <MachineTranslated xmlns="4873beb7-5857-4685-be1f-d57550cc96cc">false</MachineTranslated>
-    <OriginalSourceMarket xmlns="4873beb7-5857-4685-be1f-d57550cc96cc" xsi:nil="true"/>
-    <APDescription xmlns="4873beb7-5857-4685-be1f-d57550cc96cc" xsi:nil="true"/>
-    <ClipArtFilename xmlns="4873beb7-5857-4685-be1f-d57550cc96cc" xsi:nil="true"/>
-    <ContentItem xmlns="4873beb7-5857-4685-be1f-d57550cc96cc" xsi:nil="true"/>
-    <TPInstallLocation xmlns="4873beb7-5857-4685-be1f-d57550cc96cc" xsi:nil="true"/>
-    <PublishTargets xmlns="4873beb7-5857-4685-be1f-d57550cc96cc">OfficeOnlineVNext</PublishTargets>
-    <TimesCloned xmlns="4873beb7-5857-4685-be1f-d57550cc96cc" xsi:nil="true"/>
-    <AssetStart xmlns="4873beb7-5857-4685-be1f-d57550cc96cc">2011-12-12T13:37:00+00:00</AssetStart>
-    <Provider xmlns="4873beb7-5857-4685-be1f-d57550cc96cc" xsi:nil="true"/>
-    <AcquiredFrom xmlns="4873beb7-5857-4685-be1f-d57550cc96cc">Internal MS</AcquiredFrom>
-    <FriendlyTitle xmlns="4873beb7-5857-4685-be1f-d57550cc96cc" xsi:nil="true"/>
-    <LastHandOff xmlns="4873beb7-5857-4685-be1f-d57550cc96cc" xsi:nil="true"/>
-    <TPClientViewer xmlns="4873beb7-5857-4685-be1f-d57550cc96cc" xsi:nil="true"/>
-    <UACurrentWords xmlns="4873beb7-5857-4685-be1f-d57550cc96cc" xsi:nil="true"/>
-    <ArtSampleDocs xmlns="4873beb7-5857-4685-be1f-d57550cc96cc" xsi:nil="true"/>
-    <UALocRecommendation xmlns="4873beb7-5857-4685-be1f-d57550cc96cc">Localize</UALocRecommendation>
-    <Manager xmlns="4873beb7-5857-4685-be1f-d57550cc96cc" xsi:nil="true"/>
-    <ShowIn xmlns="4873beb7-5857-4685-be1f-d57550cc96cc">Show everywhere</ShowIn>
-    <UANotes xmlns="4873beb7-5857-4685-be1f-d57550cc96cc" xsi:nil="true"/>
-    <TemplateStatus xmlns="4873beb7-5857-4685-be1f-d57550cc96cc">Complete</TemplateStatus>
-    <InternalTagsTaxHTField0 xmlns="4873beb7-5857-4685-be1f-d57550cc96cc">
-      <Terms xmlns="http://schemas.microsoft.com/office/infopath/2007/PartnerControls"/>
-    </InternalTagsTaxHTField0>
-    <CSXHash xmlns="4873beb7-5857-4685-be1f-d57550cc96cc" xsi:nil="true"/>
-    <Downloads xmlns="4873beb7-5857-4685-be1f-d57550cc96cc">0</Downloads>
-    <VoteCount xmlns="4873beb7-5857-4685-be1f-d57550cc96cc" xsi:nil="true"/>
-    <OOCacheId xmlns="4873beb7-5857-4685-be1f-d57550cc96cc" xsi:nil="true"/>
-    <IsDeleted xmlns="4873beb7-5857-4685-be1f-d57550cc96cc">false</IsDeleted>
-    <AssetExpire xmlns="4873beb7-5857-4685-be1f-d57550cc96cc">2035-01-01T08:00:00+00:00</AssetExpire>
-    <DSATActionTaken xmlns="4873beb7-5857-4685-be1f-d57550cc96cc" xsi:nil="true"/>
-    <CSXSubmissionMarket xmlns="4873beb7-5857-4685-be1f-d57550cc96cc" xsi:nil="true"/>
-    <TPExecutable xmlns="4873beb7-5857-4685-be1f-d57550cc96cc" xsi:nil="true"/>
-    <SubmitterId xmlns="4873beb7-5857-4685-be1f-d57550cc96cc" xsi:nil="true"/>
-    <EditorialTags xmlns="4873beb7-5857-4685-be1f-d57550cc96cc" xsi:nil="true"/>
-    <ApprovalLog xmlns="4873beb7-5857-4685-be1f-d57550cc96cc" xsi:nil="true"/>
-    <AssetType xmlns="4873beb7-5857-4685-be1f-d57550cc96cc">TP</AssetType>
-    <BugNumber xmlns="4873beb7-5857-4685-be1f-d57550cc96cc" xsi:nil="true"/>
-    <CSXSubmissionDate xmlns="4873beb7-5857-4685-be1f-d57550cc96cc" xsi:nil="true"/>
-    <CSXUpdate xmlns="4873beb7-5857-4685-be1f-d57550cc96cc">false</CSXUpdate>
-    <Milestone xmlns="4873beb7-5857-4685-be1f-d57550cc96cc" xsi:nil="true"/>
-    <RecommendationsModifier xmlns="4873beb7-5857-4685-be1f-d57550cc96cc" xsi:nil="true"/>
-    <OriginAsset xmlns="4873beb7-5857-4685-be1f-d57550cc96cc" xsi:nil="true"/>
-    <TPComponent xmlns="4873beb7-5857-4685-be1f-d57550cc96cc" xsi:nil="true"/>
-    <AssetId xmlns="4873beb7-5857-4685-be1f-d57550cc96cc">TP102801114</AssetId>
-    <IntlLocPriority xmlns="4873beb7-5857-4685-be1f-d57550cc96cc" xsi:nil="true"/>
-    <PolicheckWords xmlns="4873beb7-5857-4685-be1f-d57550cc96cc" xsi:nil="true"/>
-    <TPLaunchHelpLink xmlns="4873beb7-5857-4685-be1f-d57550cc96cc" xsi:nil="true"/>
-    <TPApplication xmlns="4873beb7-5857-4685-be1f-d57550cc96cc" xsi:nil="true"/>
-    <CrawlForDependencies xmlns="4873beb7-5857-4685-be1f-d57550cc96cc">false</CrawlForDependencies>
-    <HandoffToMSDN xmlns="4873beb7-5857-4685-be1f-d57550cc96cc" xsi:nil="true"/>
-    <PlannedPubDate xmlns="4873beb7-5857-4685-be1f-d57550cc96cc" xsi:nil="true"/>
-    <IntlLangReviewer xmlns="4873beb7-5857-4685-be1f-d57550cc96cc" xsi:nil="true"/>
-    <TrustLevel xmlns="4873beb7-5857-4685-be1f-d57550cc96cc">1 Microsoft Managed Content</TrustLevel>
-    <LocLastLocAttemptVersionLookup xmlns="4873beb7-5857-4685-be1f-d57550cc96cc">706531</LocLastLocAttemptVersionLookup>
-    <IsSearchable xmlns="4873beb7-5857-4685-be1f-d57550cc96cc">true</IsSearchable>
-    <TemplateTemplateType xmlns="4873beb7-5857-4685-be1f-d57550cc96cc">PowerPoint Presentation Template</TemplateTemplateType>
-    <CampaignTagsTaxHTField0 xmlns="4873beb7-5857-4685-be1f-d57550cc96cc">
-      <Terms xmlns="http://schemas.microsoft.com/office/infopath/2007/PartnerControls"/>
-    </CampaignTagsTaxHTField0>
-    <TPNamespace xmlns="4873beb7-5857-4685-be1f-d57550cc96cc" xsi:nil="true"/>
-    <TaxCatchAll xmlns="4873beb7-5857-4685-be1f-d57550cc96cc"/>
-    <Markets xmlns="4873beb7-5857-4685-be1f-d57550cc96cc"/>
-    <UAProjectedTotalWords xmlns="4873beb7-5857-4685-be1f-d57550cc96cc" xsi:nil="true"/>
-    <IntlLangReview xmlns="4873beb7-5857-4685-be1f-d57550cc96cc">false</IntlLangReview>
-    <OutputCachingOn xmlns="4873beb7-5857-4685-be1f-d57550cc96cc">false</OutputCachingOn>
-    <AverageRating xmlns="4873beb7-5857-4685-be1f-d57550cc96cc" xsi:nil="true"/>
-    <APAuthor xmlns="4873beb7-5857-4685-be1f-d57550cc96cc">
-      <UserInfo>
-        <DisplayName>REDMOND\v-soujap</DisplayName>
-        <AccountId>1954</AccountId>
-        <AccountType/>
-      </UserInfo>
-    </APAuthor>
-    <LocManualTestRequired xmlns="4873beb7-5857-4685-be1f-d57550cc96cc">false</LocManualTestRequired>
-    <TPCommandLine xmlns="4873beb7-5857-4685-be1f-d57550cc96cc" xsi:nil="true"/>
-    <TPAppVersion xmlns="4873beb7-5857-4685-be1f-d57550cc96cc" xsi:nil="true"/>
-    <EditorialStatus xmlns="4873beb7-5857-4685-be1f-d57550cc96cc">Complete</EditorialStatus>
-    <LastModifiedDateTime xmlns="4873beb7-5857-4685-be1f-d57550cc96cc" xsi:nil="true"/>
-    <ScenarioTagsTaxHTField0 xmlns="4873beb7-5857-4685-be1f-d57550cc96cc">
-      <Terms xmlns="http://schemas.microsoft.com/office/infopath/2007/PartnerControls"/>
-    </ScenarioTagsTaxHTField0>
-    <OriginalRelease xmlns="4873beb7-5857-4685-be1f-d57550cc96cc">14</OriginalRelease>
-    <TPLaunchHelpLinkType xmlns="4873beb7-5857-4685-be1f-d57550cc96cc">Template</TPLaunchHelpLinkType>
-    <LocalizationTagsTaxHTField0 xmlns="4873beb7-5857-4685-be1f-d57550cc96cc">
-      <Terms xmlns="http://schemas.microsoft.com/office/infopath/2007/PartnerControls"/>
-    </LocalizationTagsTaxHTField0>
-    <LocMarketGroupTiers2 xmlns="4873beb7-5857-4685-be1f-d57550cc96cc" xsi:nil="true"/>
-  </documentManagement>
-</p:properties>
+<file path=customXml/itemProps1.xml><?xml version="1.0" encoding="utf-8"?>
+<ds:datastoreItem xmlns:ds="http://schemas.openxmlformats.org/officeDocument/2006/customXml" ds:itemID="{C335E791-7449-4708-8DE9-182EC4D8A134}">
+  <ds:schemaRefs>
+    <ds:schemaRef ds:uri="http://purl.org/dc/terms/"/>
+    <ds:schemaRef ds:uri="4873beb7-5857-4685-be1f-d57550cc96cc"/>
+    <ds:schemaRef ds:uri="http://schemas.openxmlformats.org/package/2006/metadata/core-properties"/>
+    <ds:schemaRef ds:uri="http://schemas.microsoft.com/office/2006/documentManagement/types"/>
+    <ds:schemaRef ds:uri="http://schemas.microsoft.com/office/infopath/2007/PartnerControls"/>
+    <ds:schemaRef ds:uri="http://purl.org/dc/elements/1.1/"/>
+    <ds:schemaRef ds:uri="http://schemas.microsoft.com/office/2006/metadata/properties"/>
+    <ds:schemaRef ds:uri="http://www.w3.org/XML/1998/namespace"/>
+    <ds:schemaRef ds:uri="http://purl.org/dc/dcmitype/"/>
+  </ds:schemaRefs>
+</ds:datastoreItem>
 </file>
 
-<file path=customXml/itemProps1.xml><?xml version="1.0" encoding="utf-8"?>
+<file path=customXml/itemProps2.xml><?xml version="1.0" encoding="utf-8"?>
 <ds:datastoreItem xmlns:ds="http://schemas.openxmlformats.org/officeDocument/2006/customXml" ds:itemID="{3C20563B-C646-42AF-9D0D-76DF086793C3}">
   <ds:schemaRefs>
     <ds:schemaRef ds:uri="http://schemas.microsoft.com/sharepoint/v3/contenttype/forms"/>
@@ -8810,7 +8098,7 @@
 </ds:datastoreItem>
 </file>
 
-<file path=customXml/itemProps2.xml><?xml version="1.0" encoding="utf-8"?>
+<file path=customXml/itemProps3.xml><?xml version="1.0" encoding="utf-8"?>
 <ds:datastoreItem xmlns:ds="http://schemas.openxmlformats.org/officeDocument/2006/customXml" ds:itemID="{6EB9514F-6A45-47F4-BC6D-A865E2971712}">
   <ds:schemaRefs>
     <ds:schemaRef ds:uri="http://schemas.microsoft.com/office/2006/metadata/contentType"/>
@@ -8826,20 +8114,4 @@
     <ds:schemaRef ds:uri="http://schemas.microsoft.com/internal/obd"/>
   </ds:schemaRefs>
 </ds:datastoreItem>
-</file>
-
-<file path=customXml/itemProps3.xml><?xml version="1.0" encoding="utf-8"?>
-<ds:datastoreItem xmlns:ds="http://schemas.openxmlformats.org/officeDocument/2006/customXml" ds:itemID="{C335E791-7449-4708-8DE9-182EC4D8A134}">
-  <ds:schemaRefs>
-    <ds:schemaRef ds:uri="http://purl.org/dc/terms/"/>
-    <ds:schemaRef ds:uri="4873beb7-5857-4685-be1f-d57550cc96cc"/>
-    <ds:schemaRef ds:uri="http://schemas.openxmlformats.org/package/2006/metadata/core-properties"/>
-    <ds:schemaRef ds:uri="http://schemas.microsoft.com/office/2006/documentManagement/types"/>
-    <ds:schemaRef ds:uri="http://schemas.microsoft.com/office/infopath/2007/PartnerControls"/>
-    <ds:schemaRef ds:uri="http://purl.org/dc/elements/1.1/"/>
-    <ds:schemaRef ds:uri="http://schemas.microsoft.com/office/2006/metadata/properties"/>
-    <ds:schemaRef ds:uri="http://www.w3.org/XML/1998/namespace"/>
-    <ds:schemaRef ds:uri="http://purl.org/dc/dcmitype/"/>
-  </ds:schemaRefs>
-</ds:datastoreItem>
 </file>
</xml_diff>